<commit_message>
Added one illustraction for the final presentation
</commit_message>
<xml_diff>
--- a/presentation/Pattern Extraction Final.pptx
+++ b/presentation/Pattern Extraction Final.pptx
@@ -6,7 +6,7 @@
     <p:sldMasterId id="2147483711" r:id="rId2"/>
   </p:sldMasterIdLst>
   <p:notesMasterIdLst>
-    <p:notesMasterId r:id="rId24"/>
+    <p:notesMasterId r:id="rId25"/>
   </p:notesMasterIdLst>
   <p:sldIdLst>
     <p:sldId id="256" r:id="rId3"/>
@@ -18,18 +18,19 @@
     <p:sldId id="304" r:id="rId9"/>
     <p:sldId id="289" r:id="rId10"/>
     <p:sldId id="295" r:id="rId11"/>
-    <p:sldId id="303" r:id="rId12"/>
-    <p:sldId id="305" r:id="rId13"/>
-    <p:sldId id="306" r:id="rId14"/>
-    <p:sldId id="307" r:id="rId15"/>
-    <p:sldId id="308" r:id="rId16"/>
-    <p:sldId id="296" r:id="rId17"/>
-    <p:sldId id="310" r:id="rId18"/>
-    <p:sldId id="309" r:id="rId19"/>
-    <p:sldId id="311" r:id="rId20"/>
-    <p:sldId id="312" r:id="rId21"/>
-    <p:sldId id="313" r:id="rId22"/>
-    <p:sldId id="285" r:id="rId23"/>
+    <p:sldId id="314" r:id="rId12"/>
+    <p:sldId id="303" r:id="rId13"/>
+    <p:sldId id="305" r:id="rId14"/>
+    <p:sldId id="306" r:id="rId15"/>
+    <p:sldId id="307" r:id="rId16"/>
+    <p:sldId id="308" r:id="rId17"/>
+    <p:sldId id="296" r:id="rId18"/>
+    <p:sldId id="310" r:id="rId19"/>
+    <p:sldId id="309" r:id="rId20"/>
+    <p:sldId id="311" r:id="rId21"/>
+    <p:sldId id="312" r:id="rId22"/>
+    <p:sldId id="313" r:id="rId23"/>
+    <p:sldId id="285" r:id="rId24"/>
   </p:sldIdLst>
   <p:sldSz cx="12192000" cy="6858000"/>
   <p:notesSz cx="6858000" cy="9144000"/>
@@ -442,11 +443,11 @@
         </c:dLbls>
         <c:gapWidth val="119"/>
         <c:overlap val="-27"/>
-        <c:axId val="404157184"/>
-        <c:axId val="404163168"/>
+        <c:axId val="-1006311264"/>
+        <c:axId val="-791007296"/>
       </c:barChart>
       <c:catAx>
-        <c:axId val="404157184"/>
+        <c:axId val="-1006311264"/>
         <c:scaling>
           <c:orientation val="minMax"/>
         </c:scaling>
@@ -489,7 +490,7 @@
             <a:endParaRPr lang="fr-FR"/>
           </a:p>
         </c:txPr>
-        <c:crossAx val="404163168"/>
+        <c:crossAx val="-791007296"/>
         <c:crosses val="autoZero"/>
         <c:auto val="1"/>
         <c:lblAlgn val="ctr"/>
@@ -497,7 +498,7 @@
         <c:noMultiLvlLbl val="0"/>
       </c:catAx>
       <c:valAx>
-        <c:axId val="404163168"/>
+        <c:axId val="-791007296"/>
         <c:scaling>
           <c:orientation val="minMax"/>
           <c:max val="1"/>
@@ -614,7 +615,7 @@
             <a:endParaRPr lang="fr-FR"/>
           </a:p>
         </c:txPr>
-        <c:crossAx val="404157184"/>
+        <c:crossAx val="-1006311264"/>
         <c:crosses val="autoZero"/>
         <c:crossBetween val="between"/>
       </c:valAx>
@@ -1056,11 +1057,11 @@
           <c:showBubbleSize val="0"/>
         </c:dLbls>
         <c:gapWidth val="119"/>
-        <c:axId val="401314224"/>
-        <c:axId val="401318032"/>
+        <c:axId val="-791001312"/>
+        <c:axId val="-791001856"/>
       </c:barChart>
       <c:catAx>
-        <c:axId val="401314224"/>
+        <c:axId val="-791001312"/>
         <c:scaling>
           <c:orientation val="minMax"/>
         </c:scaling>
@@ -1103,7 +1104,7 @@
             <a:endParaRPr lang="fr-FR"/>
           </a:p>
         </c:txPr>
-        <c:crossAx val="401318032"/>
+        <c:crossAx val="-791001856"/>
         <c:crosses val="autoZero"/>
         <c:auto val="1"/>
         <c:lblAlgn val="ctr"/>
@@ -1111,7 +1112,7 @@
         <c:noMultiLvlLbl val="0"/>
       </c:catAx>
       <c:valAx>
-        <c:axId val="401318032"/>
+        <c:axId val="-791001856"/>
         <c:scaling>
           <c:orientation val="minMax"/>
         </c:scaling>
@@ -1219,7 +1220,7 @@
             <a:endParaRPr lang="fr-FR"/>
           </a:p>
         </c:txPr>
-        <c:crossAx val="401314224"/>
+        <c:crossAx val="-791001312"/>
         <c:crosses val="autoZero"/>
         <c:crossBetween val="between"/>
       </c:valAx>
@@ -1693,11 +1694,11 @@
           <c:showBubbleSize val="0"/>
         </c:dLbls>
         <c:gapWidth val="119"/>
-        <c:axId val="409351488"/>
-        <c:axId val="409352032"/>
+        <c:axId val="-791006208"/>
+        <c:axId val="-791004032"/>
       </c:barChart>
       <c:catAx>
-        <c:axId val="409351488"/>
+        <c:axId val="-791006208"/>
         <c:scaling>
           <c:orientation val="minMax"/>
         </c:scaling>
@@ -1740,7 +1741,7 @@
             <a:endParaRPr lang="fr-FR"/>
           </a:p>
         </c:txPr>
-        <c:crossAx val="409352032"/>
+        <c:crossAx val="-791004032"/>
         <c:crossesAt val="0"/>
         <c:auto val="1"/>
         <c:lblAlgn val="ctr"/>
@@ -1748,7 +1749,7 @@
         <c:noMultiLvlLbl val="0"/>
       </c:catAx>
       <c:valAx>
-        <c:axId val="409352032"/>
+        <c:axId val="-791004032"/>
         <c:scaling>
           <c:orientation val="minMax"/>
         </c:scaling>
@@ -1856,7 +1857,7 @@
             <a:endParaRPr lang="fr-FR"/>
           </a:p>
         </c:txPr>
-        <c:crossAx val="409351488"/>
+        <c:crossAx val="-791006208"/>
         <c:crosses val="autoZero"/>
         <c:crossBetween val="between"/>
         <c:majorUnit val="0.1"/>
@@ -3640,7 +3641,7 @@
           <a:p>
             <a:fld id="{EBACBB57-5019-4C34-B895-9DAC8A1F72A5}" type="datetimeFigureOut">
               <a:rPr lang="fr-CH" smtClean="0"/>
-              <a:t>18.05.2020</a:t>
+              <a:t>19.05.2020</a:t>
             </a:fld>
             <a:endParaRPr lang="fr-CH"/>
           </a:p>
@@ -4326,7 +4327,7 @@
           <a:p>
             <a:fld id="{A1C5EC13-83CD-46FC-A749-A66713452AB8}" type="datetime1">
               <a:rPr lang="fr-CH" smtClean="0"/>
-              <a:t>18.05.2020</a:t>
+              <a:t>19.05.2020</a:t>
             </a:fld>
             <a:endParaRPr lang="fr-CH"/>
           </a:p>
@@ -4513,7 +4514,7 @@
           <a:p>
             <a:fld id="{7E456747-9D74-4D5C-A57B-216C1DCF555B}" type="datetime1">
               <a:rPr lang="fr-CH" smtClean="0"/>
-              <a:t>18.05.2020</a:t>
+              <a:t>19.05.2020</a:t>
             </a:fld>
             <a:endParaRPr lang="fr-CH"/>
           </a:p>
@@ -4693,7 +4694,7 @@
           <a:p>
             <a:fld id="{35AB7460-04F9-4582-9AE7-9E23C393B231}" type="datetime1">
               <a:rPr lang="fr-CH" smtClean="0"/>
-              <a:t>18.05.2020</a:t>
+              <a:t>19.05.2020</a:t>
             </a:fld>
             <a:endParaRPr lang="fr-CH"/>
           </a:p>
@@ -4878,7 +4879,7 @@
           <a:p>
             <a:fld id="{443BA57E-7B21-4F6F-82E1-FF01CD7ABA13}" type="datetime1">
               <a:rPr lang="fr-CH" smtClean="0"/>
-              <a:t>18.05.2020</a:t>
+              <a:t>19.05.2020</a:t>
             </a:fld>
             <a:endParaRPr lang="en-US" dirty="0"/>
           </a:p>
@@ -5696,7 +5697,7 @@
           <a:p>
             <a:fld id="{062309E3-34CC-4F3C-A1BD-713587317DF7}" type="datetime1">
               <a:rPr lang="fr-CH" smtClean="0"/>
-              <a:t>18.05.2020</a:t>
+              <a:t>19.05.2020</a:t>
             </a:fld>
             <a:endParaRPr lang="fr-CH"/>
           </a:p>
@@ -5878,7 +5879,7 @@
           <a:p>
             <a:fld id="{CA50544D-CD99-4DB3-9168-B3A8E20C09FE}" type="datetime1">
               <a:rPr lang="fr-CH" smtClean="0"/>
-              <a:t>18.05.2020</a:t>
+              <a:t>19.05.2020</a:t>
             </a:fld>
             <a:endParaRPr lang="fr-CH"/>
           </a:p>
@@ -6132,7 +6133,7 @@
           <a:p>
             <a:fld id="{0BA05AE5-1ED1-49B1-BD0C-362DD8300DA6}" type="datetime1">
               <a:rPr lang="fr-CH" smtClean="0"/>
-              <a:t>18.05.2020</a:t>
+              <a:t>19.05.2020</a:t>
             </a:fld>
             <a:endParaRPr lang="fr-CH"/>
           </a:p>
@@ -6371,7 +6372,7 @@
           <a:p>
             <a:fld id="{F321FB04-B1F8-410C-91A1-6F9F06ABF9AD}" type="datetime1">
               <a:rPr lang="fr-CH" smtClean="0"/>
-              <a:t>18.05.2020</a:t>
+              <a:t>19.05.2020</a:t>
             </a:fld>
             <a:endParaRPr lang="fr-CH"/>
           </a:p>
@@ -6745,7 +6746,7 @@
           <a:p>
             <a:fld id="{B78CB868-B46E-4481-9B17-F23B1E033C87}" type="datetime1">
               <a:rPr lang="fr-CH" smtClean="0"/>
-              <a:t>18.05.2020</a:t>
+              <a:t>19.05.2020</a:t>
             </a:fld>
             <a:endParaRPr lang="fr-CH"/>
           </a:p>
@@ -6868,7 +6869,7 @@
           <a:p>
             <a:fld id="{AED0E9EF-17A4-4D73-89B5-BE4B97634EE6}" type="datetime1">
               <a:rPr lang="fr-CH" smtClean="0"/>
-              <a:t>18.05.2020</a:t>
+              <a:t>19.05.2020</a:t>
             </a:fld>
             <a:endParaRPr lang="fr-CH"/>
           </a:p>
@@ -6963,7 +6964,7 @@
           <a:p>
             <a:fld id="{185805BF-25D7-407C-8F23-26F91DDF1D3E}" type="datetime1">
               <a:rPr lang="fr-CH" smtClean="0"/>
-              <a:t>18.05.2020</a:t>
+              <a:t>19.05.2020</a:t>
             </a:fld>
             <a:endParaRPr lang="fr-CH"/>
           </a:p>
@@ -7233,7 +7234,7 @@
           <a:p>
             <a:fld id="{159142C7-4527-4223-B0C3-EFB260406640}" type="datetime1">
               <a:rPr lang="fr-CH" smtClean="0"/>
-              <a:t>18.05.2020</a:t>
+              <a:t>19.05.2020</a:t>
             </a:fld>
             <a:endParaRPr lang="fr-CH"/>
           </a:p>
@@ -7505,7 +7506,7 @@
           <a:p>
             <a:fld id="{76BB6D0E-3881-4B3D-96CD-ECBF10879B6D}" type="datetime1">
               <a:rPr lang="fr-CH" smtClean="0"/>
-              <a:t>18.05.2020</a:t>
+              <a:t>19.05.2020</a:t>
             </a:fld>
             <a:endParaRPr lang="fr-CH"/>
           </a:p>
@@ -7810,7 +7811,7 @@
           <a:p>
             <a:fld id="{CE03783F-3525-484F-BB92-A97332512ECC}" type="datetime1">
               <a:rPr lang="fr-CH" smtClean="0"/>
-              <a:t>18.05.2020</a:t>
+              <a:t>19.05.2020</a:t>
             </a:fld>
             <a:endParaRPr lang="fr-CH"/>
           </a:p>
@@ -8019,7 +8020,7 @@
           <a:p>
             <a:fld id="{3DD17AEC-70AF-45C1-A4D8-B9682E9F5690}" type="datetime1">
               <a:rPr lang="fr-CH" smtClean="0"/>
-              <a:t>18.05.2020</a:t>
+              <a:t>19.05.2020</a:t>
             </a:fld>
             <a:endParaRPr lang="fr-CH"/>
           </a:p>
@@ -8333,7 +8334,7 @@
           <a:p>
             <a:fld id="{DD598F42-9E37-44B5-9404-FFDB7BFA3C58}" type="datetime1">
               <a:rPr lang="fr-CH" smtClean="0"/>
-              <a:t>18.05.2020</a:t>
+              <a:t>19.05.2020</a:t>
             </a:fld>
             <a:endParaRPr lang="fr-CH"/>
           </a:p>
@@ -8666,7 +8667,7 @@
           <a:p>
             <a:fld id="{D80A43B4-503F-48B3-9D69-A1E033EB31DC}" type="datetime1">
               <a:rPr lang="fr-CH" smtClean="0"/>
-              <a:t>18.05.2020</a:t>
+              <a:t>19.05.2020</a:t>
             </a:fld>
             <a:endParaRPr lang="fr-CH"/>
           </a:p>
@@ -8980,7 +8981,7 @@
           <a:p>
             <a:fld id="{C63570D4-DC05-4346-960C-EE641E3F13E6}" type="datetime1">
               <a:rPr lang="fr-CH" smtClean="0"/>
-              <a:t>18.05.2020</a:t>
+              <a:t>19.05.2020</a:t>
             </a:fld>
             <a:endParaRPr lang="fr-CH"/>
           </a:p>
@@ -9373,7 +9374,7 @@
           <a:p>
             <a:fld id="{6DAD8BB9-B4F7-4387-B4ED-AABAD1F880A7}" type="datetime1">
               <a:rPr lang="fr-CH" smtClean="0"/>
-              <a:t>18.05.2020</a:t>
+              <a:t>19.05.2020</a:t>
             </a:fld>
             <a:endParaRPr lang="fr-CH"/>
           </a:p>
@@ -9543,7 +9544,7 @@
           <a:p>
             <a:fld id="{5AECCC42-73C7-497A-91BC-5B46DEBB8AEF}" type="datetime1">
               <a:rPr lang="fr-CH" smtClean="0"/>
-              <a:t>18.05.2020</a:t>
+              <a:t>19.05.2020</a:t>
             </a:fld>
             <a:endParaRPr lang="fr-CH"/>
           </a:p>
@@ -9723,7 +9724,7 @@
           <a:p>
             <a:fld id="{24A8B8C1-AC7C-4439-ABE1-977A3F495DB0}" type="datetime1">
               <a:rPr lang="fr-CH" smtClean="0"/>
-              <a:t>18.05.2020</a:t>
+              <a:t>19.05.2020</a:t>
             </a:fld>
             <a:endParaRPr lang="fr-CH"/>
           </a:p>
@@ -9969,7 +9970,7 @@
           <a:p>
             <a:fld id="{8A489873-EBA8-4E74-A188-36791492334D}" type="datetime1">
               <a:rPr lang="fr-CH" smtClean="0"/>
-              <a:t>18.05.2020</a:t>
+              <a:t>19.05.2020</a:t>
             </a:fld>
             <a:endParaRPr lang="fr-CH"/>
           </a:p>
@@ -10208,7 +10209,7 @@
           <a:p>
             <a:fld id="{2716B30A-CC25-498D-A978-F9C8FA3447EC}" type="datetime1">
               <a:rPr lang="fr-CH" smtClean="0"/>
-              <a:t>18.05.2020</a:t>
+              <a:t>19.05.2020</a:t>
             </a:fld>
             <a:endParaRPr lang="fr-CH"/>
           </a:p>
@@ -10582,7 +10583,7 @@
           <a:p>
             <a:fld id="{86F0612F-4B27-4C50-9FEF-D899F02BE98F}" type="datetime1">
               <a:rPr lang="fr-CH" smtClean="0"/>
-              <a:t>18.05.2020</a:t>
+              <a:t>19.05.2020</a:t>
             </a:fld>
             <a:endParaRPr lang="fr-CH"/>
           </a:p>
@@ -10707,7 +10708,7 @@
           <a:p>
             <a:fld id="{1F3DD3EA-FE5E-4B40-AAF2-7BDC6B236448}" type="datetime1">
               <a:rPr lang="fr-CH" smtClean="0"/>
-              <a:t>18.05.2020</a:t>
+              <a:t>19.05.2020</a:t>
             </a:fld>
             <a:endParaRPr lang="fr-CH"/>
           </a:p>
@@ -10802,7 +10803,7 @@
           <a:p>
             <a:fld id="{DFCE601C-520E-4D95-87EA-C15A6C947E77}" type="datetime1">
               <a:rPr lang="fr-CH" smtClean="0"/>
-              <a:t>18.05.2020</a:t>
+              <a:t>19.05.2020</a:t>
             </a:fld>
             <a:endParaRPr lang="fr-CH"/>
           </a:p>
@@ -11079,7 +11080,7 @@
           <a:p>
             <a:fld id="{7CDD90FB-8902-44F1-AFF3-670F9F6ABDF8}" type="datetime1">
               <a:rPr lang="fr-CH" smtClean="0"/>
-              <a:t>18.05.2020</a:t>
+              <a:t>19.05.2020</a:t>
             </a:fld>
             <a:endParaRPr lang="fr-CH"/>
           </a:p>
@@ -11332,7 +11333,7 @@
           <a:p>
             <a:fld id="{6A97B839-6A40-4321-AA7D-D18AFAC76C0E}" type="datetime1">
               <a:rPr lang="fr-CH" smtClean="0"/>
-              <a:t>18.05.2020</a:t>
+              <a:t>19.05.2020</a:t>
             </a:fld>
             <a:endParaRPr lang="fr-CH"/>
           </a:p>
@@ -11545,7 +11546,7 @@
           <a:p>
             <a:fld id="{36C5D13F-9125-4315-B7A7-EB82236C947E}" type="datetime1">
               <a:rPr lang="fr-CH" smtClean="0"/>
-              <a:t>18.05.2020</a:t>
+              <a:t>19.05.2020</a:t>
             </a:fld>
             <a:endParaRPr lang="fr-CH"/>
           </a:p>
@@ -12626,7 +12627,7 @@
           <a:p>
             <a:fld id="{35BA6938-53D0-4653-82AB-3885BCA89A92}" type="datetime1">
               <a:rPr lang="fr-CH" smtClean="0"/>
-              <a:t>18.05.2020</a:t>
+              <a:t>19.05.2020</a:t>
             </a:fld>
             <a:endParaRPr lang="fr-CH"/>
           </a:p>
@@ -13284,21 +13285,54 @@
           <a:bodyPr/>
           <a:lstStyle/>
           <a:p>
-            <a:r>
-              <a:rPr lang="fr-CH" dirty="0" smtClean="0"/>
-              <a:t>Conception: Pattern </a:t>
-            </a:r>
-            <a:r>
-              <a:rPr lang="fr-CH" dirty="0" err="1" smtClean="0"/>
-              <a:t>counting</a:t>
-            </a:r>
+            <a:endParaRPr lang="fr-CH"/>
+          </a:p>
+        </p:txBody>
+      </p:sp>
+      <p:sp>
+        <p:nvSpPr>
+          <p:cNvPr id="3" name="Espace réservé du contenu 2"/>
+          <p:cNvSpPr>
+            <a:spLocks noGrp="1"/>
+          </p:cNvSpPr>
+          <p:nvPr>
+            <p:ph idx="1"/>
+          </p:nvPr>
+        </p:nvSpPr>
+        <p:spPr/>
+        <p:txBody>
+          <a:bodyPr/>
+          <a:lstStyle/>
+          <a:p>
+            <a:endParaRPr lang="fr-CH" dirty="0" smtClean="0"/>
+          </a:p>
+          <a:p>
             <a:endParaRPr lang="fr-CH" dirty="0"/>
           </a:p>
-        </p:txBody>
-      </p:sp>
-      <p:sp>
-        <p:nvSpPr>
-          <p:cNvPr id="8" name="Espace réservé du numéro de diapositive 7"/>
+          <a:p>
+            <a:endParaRPr lang="fr-CH" dirty="0" smtClean="0"/>
+          </a:p>
+          <a:p>
+            <a:endParaRPr lang="fr-CH" sz="1800" dirty="0"/>
+          </a:p>
+          <a:p>
+            <a:endParaRPr lang="fr-CH" sz="1050" dirty="0"/>
+          </a:p>
+          <a:p>
+            <a:pPr marL="0" indent="0">
+              <a:buNone/>
+            </a:pPr>
+            <a:r>
+              <a:rPr lang="fr-CH" sz="2000" dirty="0" smtClean="0"/>
+              <a:t>           …</a:t>
+            </a:r>
+            <a:endParaRPr lang="fr-CH" sz="1050" dirty="0" smtClean="0"/>
+          </a:p>
+        </p:txBody>
+      </p:sp>
+      <p:sp>
+        <p:nvSpPr>
+          <p:cNvPr id="4" name="Espace réservé du numéro de diapositive 3"/>
           <p:cNvSpPr>
             <a:spLocks noGrp="1"/>
           </p:cNvSpPr>
@@ -13314,6 +13348,139 @@
             <a:fld id="{F60449C3-8BCD-4455-8E2A-A866209B9601}" type="slidenum">
               <a:rPr lang="fr-CH" smtClean="0"/>
               <a:t>10</a:t>
+            </a:fld>
+            <a:endParaRPr lang="fr-CH"/>
+          </a:p>
+        </p:txBody>
+      </p:sp>
+      <p:pic>
+        <p:nvPicPr>
+          <p:cNvPr id="5" name="Image 4"/>
+          <p:cNvPicPr>
+            <a:picLocks noChangeAspect="1"/>
+          </p:cNvPicPr>
+          <p:nvPr/>
+        </p:nvPicPr>
+        <p:blipFill rotWithShape="1">
+          <a:blip r:embed="rId2"/>
+          <a:srcRect l="2377" r="9193" b="10375"/>
+          <a:stretch/>
+        </p:blipFill>
+        <p:spPr>
+          <a:xfrm>
+            <a:off x="677334" y="432031"/>
+            <a:ext cx="9391650" cy="3320820"/>
+          </a:xfrm>
+          <a:prstGeom prst="rect">
+            <a:avLst/>
+          </a:prstGeom>
+        </p:spPr>
+      </p:pic>
+      <p:pic>
+        <p:nvPicPr>
+          <p:cNvPr id="6" name="Image 5"/>
+          <p:cNvPicPr>
+            <a:picLocks noChangeAspect="1"/>
+          </p:cNvPicPr>
+          <p:nvPr/>
+        </p:nvPicPr>
+        <p:blipFill rotWithShape="1">
+          <a:blip r:embed="rId3"/>
+          <a:srcRect l="11101" t="43703" r="17282"/>
+          <a:stretch/>
+        </p:blipFill>
+        <p:spPr>
+          <a:xfrm>
+            <a:off x="677334" y="4405648"/>
+            <a:ext cx="9401175" cy="1635714"/>
+          </a:xfrm>
+          <a:prstGeom prst="rect">
+            <a:avLst/>
+          </a:prstGeom>
+        </p:spPr>
+      </p:pic>
+    </p:spTree>
+    <p:extLst>
+      <p:ext uri="{BB962C8B-B14F-4D97-AF65-F5344CB8AC3E}">
+        <p14:creationId xmlns:p14="http://schemas.microsoft.com/office/powerpoint/2010/main" val="3984006971"/>
+      </p:ext>
+    </p:extLst>
+  </p:cSld>
+  <p:clrMapOvr>
+    <a:masterClrMapping/>
+  </p:clrMapOvr>
+  <p:timing>
+    <p:tnLst>
+      <p:par>
+        <p:cTn id="1" dur="indefinite" restart="never" nodeType="tmRoot"/>
+      </p:par>
+    </p:tnLst>
+  </p:timing>
+</p:sld>
+</file>
+
+<file path=ppt/slides/slide11.xml><?xml version="1.0" encoding="utf-8"?>
+<p:sld xmlns:a="http://schemas.openxmlformats.org/drawingml/2006/main" xmlns:r="http://schemas.openxmlformats.org/officeDocument/2006/relationships" xmlns:p="http://schemas.openxmlformats.org/presentationml/2006/main">
+  <p:cSld>
+    <p:spTree>
+      <p:nvGrpSpPr>
+        <p:cNvPr id="1" name=""/>
+        <p:cNvGrpSpPr/>
+        <p:nvPr/>
+      </p:nvGrpSpPr>
+      <p:grpSpPr>
+        <a:xfrm>
+          <a:off x="0" y="0"/>
+          <a:ext cx="0" cy="0"/>
+          <a:chOff x="0" y="0"/>
+          <a:chExt cx="0" cy="0"/>
+        </a:xfrm>
+      </p:grpSpPr>
+      <p:sp>
+        <p:nvSpPr>
+          <p:cNvPr id="2" name="Titre 1"/>
+          <p:cNvSpPr>
+            <a:spLocks noGrp="1"/>
+          </p:cNvSpPr>
+          <p:nvPr>
+            <p:ph type="title"/>
+          </p:nvPr>
+        </p:nvSpPr>
+        <p:spPr/>
+        <p:txBody>
+          <a:bodyPr/>
+          <a:lstStyle/>
+          <a:p>
+            <a:r>
+              <a:rPr lang="fr-CH" dirty="0" smtClean="0"/>
+              <a:t>Conception: Pattern </a:t>
+            </a:r>
+            <a:r>
+              <a:rPr lang="fr-CH" dirty="0" err="1" smtClean="0"/>
+              <a:t>counting</a:t>
+            </a:r>
+            <a:endParaRPr lang="fr-CH" dirty="0"/>
+          </a:p>
+        </p:txBody>
+      </p:sp>
+      <p:sp>
+        <p:nvSpPr>
+          <p:cNvPr id="8" name="Espace réservé du numéro de diapositive 7"/>
+          <p:cNvSpPr>
+            <a:spLocks noGrp="1"/>
+          </p:cNvSpPr>
+          <p:nvPr>
+            <p:ph type="sldNum" sz="quarter" idx="12"/>
+          </p:nvPr>
+        </p:nvSpPr>
+        <p:spPr/>
+        <p:txBody>
+          <a:bodyPr/>
+          <a:lstStyle/>
+          <a:p>
+            <a:fld id="{F60449C3-8BCD-4455-8E2A-A866209B9601}" type="slidenum">
+              <a:rPr lang="fr-CH" smtClean="0"/>
+              <a:t>11</a:t>
             </a:fld>
             <a:endParaRPr lang="fr-CH"/>
           </a:p>
@@ -13410,7 +13577,7 @@
 </p:sld>
 </file>
 
-<file path=ppt/slides/slide11.xml><?xml version="1.0" encoding="utf-8"?>
+<file path=ppt/slides/slide12.xml><?xml version="1.0" encoding="utf-8"?>
 <p:sld xmlns:a="http://schemas.openxmlformats.org/drawingml/2006/main" xmlns:r="http://schemas.openxmlformats.org/officeDocument/2006/relationships" xmlns:p="http://schemas.openxmlformats.org/presentationml/2006/main">
   <p:cSld>
     <p:spTree>
@@ -13471,7 +13638,7 @@
           <a:p>
             <a:fld id="{F60449C3-8BCD-4455-8E2A-A866209B9601}" type="slidenum">
               <a:rPr lang="fr-CH" smtClean="0"/>
-              <a:t>11</a:t>
+              <a:t>12</a:t>
             </a:fld>
             <a:endParaRPr lang="fr-CH"/>
           </a:p>
@@ -13833,7 +14000,7 @@
 </p:sld>
 </file>
 
-<file path=ppt/slides/slide12.xml><?xml version="1.0" encoding="utf-8"?>
+<file path=ppt/slides/slide13.xml><?xml version="1.0" encoding="utf-8"?>
 <p:sld xmlns:a="http://schemas.openxmlformats.org/drawingml/2006/main" xmlns:r="http://schemas.openxmlformats.org/officeDocument/2006/relationships" xmlns:p="http://schemas.openxmlformats.org/presentationml/2006/main">
   <p:cSld>
     <p:spTree>
@@ -13942,7 +14109,7 @@
           <a:p>
             <a:fld id="{F60449C3-8BCD-4455-8E2A-A866209B9601}" type="slidenum">
               <a:rPr lang="fr-CH" smtClean="0"/>
-              <a:t>12</a:t>
+              <a:t>13</a:t>
             </a:fld>
             <a:endParaRPr lang="fr-CH"/>
           </a:p>
@@ -15030,108 +15197,6 @@
 </p:sld>
 </file>
 
-<file path=ppt/slides/slide13.xml><?xml version="1.0" encoding="utf-8"?>
-<p:sld xmlns:a="http://schemas.openxmlformats.org/drawingml/2006/main" xmlns:r="http://schemas.openxmlformats.org/officeDocument/2006/relationships" xmlns:p="http://schemas.openxmlformats.org/presentationml/2006/main">
-  <p:cSld>
-    <p:spTree>
-      <p:nvGrpSpPr>
-        <p:cNvPr id="1" name=""/>
-        <p:cNvGrpSpPr/>
-        <p:nvPr/>
-      </p:nvGrpSpPr>
-      <p:grpSpPr>
-        <a:xfrm>
-          <a:off x="0" y="0"/>
-          <a:ext cx="0" cy="0"/>
-          <a:chOff x="0" y="0"/>
-          <a:chExt cx="0" cy="0"/>
-        </a:xfrm>
-      </p:grpSpPr>
-      <p:sp>
-        <p:nvSpPr>
-          <p:cNvPr id="2" name="Titre 1"/>
-          <p:cNvSpPr>
-            <a:spLocks noGrp="1"/>
-          </p:cNvSpPr>
-          <p:nvPr>
-            <p:ph type="ctrTitle"/>
-          </p:nvPr>
-        </p:nvSpPr>
-        <p:spPr/>
-        <p:txBody>
-          <a:bodyPr/>
-          <a:lstStyle/>
-          <a:p>
-            <a:r>
-              <a:rPr lang="fr-CH" dirty="0" smtClean="0"/>
-              <a:t>Utilisation</a:t>
-            </a:r>
-            <a:endParaRPr lang="fr-CH" dirty="0"/>
-          </a:p>
-        </p:txBody>
-      </p:sp>
-      <p:sp>
-        <p:nvSpPr>
-          <p:cNvPr id="3" name="Sous-titre 2"/>
-          <p:cNvSpPr>
-            <a:spLocks noGrp="1"/>
-          </p:cNvSpPr>
-          <p:nvPr>
-            <p:ph type="subTitle" idx="1"/>
-          </p:nvPr>
-        </p:nvSpPr>
-        <p:spPr/>
-        <p:txBody>
-          <a:bodyPr/>
-          <a:lstStyle/>
-          <a:p>
-            <a:endParaRPr lang="fr-CH"/>
-          </a:p>
-        </p:txBody>
-      </p:sp>
-      <p:sp>
-        <p:nvSpPr>
-          <p:cNvPr id="4" name="Espace réservé du numéro de diapositive 3"/>
-          <p:cNvSpPr>
-            <a:spLocks noGrp="1"/>
-          </p:cNvSpPr>
-          <p:nvPr>
-            <p:ph type="sldNum" sz="quarter" idx="12"/>
-          </p:nvPr>
-        </p:nvSpPr>
-        <p:spPr/>
-        <p:txBody>
-          <a:bodyPr/>
-          <a:lstStyle/>
-          <a:p>
-            <a:fld id="{F60449C3-8BCD-4455-8E2A-A866209B9601}" type="slidenum">
-              <a:rPr lang="fr-CH" smtClean="0"/>
-              <a:t>13</a:t>
-            </a:fld>
-            <a:endParaRPr lang="fr-CH"/>
-          </a:p>
-        </p:txBody>
-      </p:sp>
-    </p:spTree>
-    <p:extLst>
-      <p:ext uri="{BB962C8B-B14F-4D97-AF65-F5344CB8AC3E}">
-        <p14:creationId xmlns:p14="http://schemas.microsoft.com/office/powerpoint/2010/main" val="441191196"/>
-      </p:ext>
-    </p:extLst>
-  </p:cSld>
-  <p:clrMapOvr>
-    <a:masterClrMapping/>
-  </p:clrMapOvr>
-  <p:timing>
-    <p:tnLst>
-      <p:par>
-        <p:cTn id="1" dur="indefinite" restart="never" nodeType="tmRoot"/>
-      </p:par>
-    </p:tnLst>
-  </p:timing>
-</p:sld>
-</file>
-
 <file path=ppt/slides/slide14.xml><?xml version="1.0" encoding="utf-8"?>
 <p:sld xmlns:a="http://schemas.openxmlformats.org/drawingml/2006/main" xmlns:r="http://schemas.openxmlformats.org/officeDocument/2006/relationships" xmlns:p="http://schemas.openxmlformats.org/presentationml/2006/main">
   <p:cSld>
@@ -15156,7 +15221,7 @@
             <a:spLocks noGrp="1"/>
           </p:cNvSpPr>
           <p:nvPr>
-            <p:ph type="title"/>
+            <p:ph type="ctrTitle"/>
           </p:nvPr>
         </p:nvSpPr>
         <p:spPr/>
@@ -15165,18 +15230,29 @@
           <a:lstStyle/>
           <a:p>
             <a:r>
-              <a:rPr lang="fr-CH" dirty="0" err="1" smtClean="0"/>
-              <a:t>Repository</a:t>
-            </a:r>
-            <a:r>
               <a:rPr lang="fr-CH" dirty="0" smtClean="0"/>
-              <a:t> </a:t>
-            </a:r>
-            <a:r>
-              <a:rPr lang="fr-CH" dirty="0" err="1" smtClean="0"/>
-              <a:t>choices</a:t>
+              <a:t>Utilisation</a:t>
             </a:r>
             <a:endParaRPr lang="fr-CH" dirty="0"/>
+          </a:p>
+        </p:txBody>
+      </p:sp>
+      <p:sp>
+        <p:nvSpPr>
+          <p:cNvPr id="3" name="Sous-titre 2"/>
+          <p:cNvSpPr>
+            <a:spLocks noGrp="1"/>
+          </p:cNvSpPr>
+          <p:nvPr>
+            <p:ph type="subTitle" idx="1"/>
+          </p:nvPr>
+        </p:nvSpPr>
+        <p:spPr/>
+        <p:txBody>
+          <a:bodyPr/>
+          <a:lstStyle/>
+          <a:p>
+            <a:endParaRPr lang="fr-CH"/>
           </a:p>
         </p:txBody>
       </p:sp>
@@ -15203,277 +15279,10 @@
           </a:p>
         </p:txBody>
       </p:sp>
-      <p:sp>
-        <p:nvSpPr>
-          <p:cNvPr id="5" name="ZoneTexte 4"/>
-          <p:cNvSpPr txBox="1"/>
-          <p:nvPr/>
-        </p:nvSpPr>
-        <p:spPr>
-          <a:xfrm>
-            <a:off x="4177365" y="2094333"/>
-            <a:ext cx="1520792" cy="830997"/>
-          </a:xfrm>
-          <a:prstGeom prst="rect">
-            <a:avLst/>
-          </a:prstGeom>
-          <a:noFill/>
-        </p:spPr>
-        <p:txBody>
-          <a:bodyPr wrap="square" rtlCol="0">
-            <a:spAutoFit/>
-          </a:bodyPr>
-          <a:lstStyle/>
-          <a:p>
-            <a:r>
-              <a:rPr lang="fr-CH" sz="4800" b="1" dirty="0" smtClean="0"/>
-              <a:t>150</a:t>
-            </a:r>
-            <a:endParaRPr lang="fr-CH" sz="4800" b="1" dirty="0"/>
-          </a:p>
-        </p:txBody>
-      </p:sp>
-      <p:sp>
-        <p:nvSpPr>
-          <p:cNvPr id="6" name="ZoneTexte 5"/>
-          <p:cNvSpPr txBox="1"/>
-          <p:nvPr/>
-        </p:nvSpPr>
-        <p:spPr>
-          <a:xfrm>
-            <a:off x="5380522" y="2186665"/>
-            <a:ext cx="4543124" cy="646331"/>
-          </a:xfrm>
-          <a:prstGeom prst="rect">
-            <a:avLst/>
-          </a:prstGeom>
-          <a:noFill/>
-        </p:spPr>
-        <p:txBody>
-          <a:bodyPr wrap="square" rtlCol="0">
-            <a:spAutoFit/>
-          </a:bodyPr>
-          <a:lstStyle/>
-          <a:p>
-            <a:pPr marL="285750" indent="-285750">
-              <a:buFont typeface="Arial" panose="020B0604020202020204" pitchFamily="34" charset="0"/>
-              <a:buChar char="•"/>
-            </a:pPr>
-            <a:r>
-              <a:rPr lang="fr-CH" dirty="0" smtClean="0"/>
-              <a:t>Swift</a:t>
-            </a:r>
-          </a:p>
-          <a:p>
-            <a:pPr marL="285750" indent="-285750">
-              <a:buFont typeface="Arial" panose="020B0604020202020204" pitchFamily="34" charset="0"/>
-              <a:buChar char="•"/>
-            </a:pPr>
-            <a:r>
-              <a:rPr lang="fr-CH" dirty="0" err="1" smtClean="0"/>
-              <a:t>Descending</a:t>
-            </a:r>
-            <a:r>
-              <a:rPr lang="fr-CH" dirty="0" smtClean="0"/>
-              <a:t> </a:t>
-            </a:r>
-            <a:r>
-              <a:rPr lang="fr-CH" dirty="0" err="1" smtClean="0"/>
-              <a:t>order</a:t>
-            </a:r>
-            <a:r>
-              <a:rPr lang="fr-CH" dirty="0" smtClean="0"/>
-              <a:t> of stars</a:t>
-            </a:r>
-            <a:endParaRPr lang="fr-CH" dirty="0"/>
-          </a:p>
-        </p:txBody>
-      </p:sp>
-      <p:sp>
-        <p:nvSpPr>
-          <p:cNvPr id="7" name="ZoneTexte 6"/>
-          <p:cNvSpPr txBox="1"/>
-          <p:nvPr/>
-        </p:nvSpPr>
-        <p:spPr>
-          <a:xfrm>
-            <a:off x="2290811" y="4289655"/>
-            <a:ext cx="1520792" cy="830997"/>
-          </a:xfrm>
-          <a:prstGeom prst="rect">
-            <a:avLst/>
-          </a:prstGeom>
-          <a:noFill/>
-        </p:spPr>
-        <p:txBody>
-          <a:bodyPr wrap="square" rtlCol="0">
-            <a:spAutoFit/>
-          </a:bodyPr>
-          <a:lstStyle/>
-          <a:p>
-            <a:r>
-              <a:rPr lang="fr-CH" sz="4800" b="1" dirty="0" smtClean="0"/>
-              <a:t>27</a:t>
-            </a:r>
-            <a:endParaRPr lang="fr-CH" sz="4800" b="1" dirty="0"/>
-          </a:p>
-        </p:txBody>
-      </p:sp>
-      <p:sp>
-        <p:nvSpPr>
-          <p:cNvPr id="8" name="ZoneTexte 7"/>
-          <p:cNvSpPr txBox="1"/>
-          <p:nvPr/>
-        </p:nvSpPr>
-        <p:spPr>
-          <a:xfrm>
-            <a:off x="3136230" y="4520487"/>
-            <a:ext cx="1676400" cy="369332"/>
-          </a:xfrm>
-          <a:prstGeom prst="rect">
-            <a:avLst/>
-          </a:prstGeom>
-          <a:noFill/>
-        </p:spPr>
-        <p:txBody>
-          <a:bodyPr wrap="square" rtlCol="0">
-            <a:spAutoFit/>
-          </a:bodyPr>
-          <a:lstStyle/>
-          <a:p>
-            <a:pPr marL="285750" indent="-285750">
-              <a:buFont typeface="Arial" panose="020B0604020202020204" pitchFamily="34" charset="0"/>
-              <a:buChar char="•"/>
-            </a:pPr>
-            <a:r>
-              <a:rPr lang="fr-CH" dirty="0" err="1" smtClean="0"/>
-              <a:t>Filtered</a:t>
-            </a:r>
-            <a:r>
-              <a:rPr lang="fr-CH" dirty="0" smtClean="0"/>
-              <a:t> out</a:t>
-            </a:r>
-            <a:endParaRPr lang="fr-CH" dirty="0"/>
-          </a:p>
-        </p:txBody>
-      </p:sp>
-      <p:sp>
-        <p:nvSpPr>
-          <p:cNvPr id="9" name="ZoneTexte 8"/>
-          <p:cNvSpPr txBox="1"/>
-          <p:nvPr/>
-        </p:nvSpPr>
-        <p:spPr>
-          <a:xfrm>
-            <a:off x="6564423" y="4289655"/>
-            <a:ext cx="1520792" cy="830997"/>
-          </a:xfrm>
-          <a:prstGeom prst="rect">
-            <a:avLst/>
-          </a:prstGeom>
-          <a:noFill/>
-        </p:spPr>
-        <p:txBody>
-          <a:bodyPr wrap="square" rtlCol="0">
-            <a:spAutoFit/>
-          </a:bodyPr>
-          <a:lstStyle/>
-          <a:p>
-            <a:r>
-              <a:rPr lang="fr-CH" sz="4800" b="1" dirty="0" smtClean="0"/>
-              <a:t>123</a:t>
-            </a:r>
-            <a:endParaRPr lang="fr-CH" sz="4800" b="1" dirty="0"/>
-          </a:p>
-        </p:txBody>
-      </p:sp>
-      <p:sp>
-        <p:nvSpPr>
-          <p:cNvPr id="10" name="ZoneTexte 9"/>
-          <p:cNvSpPr txBox="1"/>
-          <p:nvPr/>
-        </p:nvSpPr>
-        <p:spPr>
-          <a:xfrm>
-            <a:off x="7665719" y="4520488"/>
-            <a:ext cx="1676400" cy="369332"/>
-          </a:xfrm>
-          <a:prstGeom prst="rect">
-            <a:avLst/>
-          </a:prstGeom>
-          <a:noFill/>
-        </p:spPr>
-        <p:txBody>
-          <a:bodyPr wrap="square" rtlCol="0">
-            <a:spAutoFit/>
-          </a:bodyPr>
-          <a:lstStyle/>
-          <a:p>
-            <a:pPr marL="285750" indent="-285750">
-              <a:buFont typeface="Arial" panose="020B0604020202020204" pitchFamily="34" charset="0"/>
-              <a:buChar char="•"/>
-            </a:pPr>
-            <a:r>
-              <a:rPr lang="fr-CH" dirty="0" err="1" smtClean="0"/>
-              <a:t>Projects</a:t>
-            </a:r>
-            <a:r>
-              <a:rPr lang="fr-CH" dirty="0" smtClean="0"/>
-              <a:t> </a:t>
-            </a:r>
-            <a:r>
-              <a:rPr lang="fr-CH" dirty="0" err="1" smtClean="0"/>
-              <a:t>left</a:t>
-            </a:r>
-            <a:endParaRPr lang="fr-CH" dirty="0"/>
-          </a:p>
-        </p:txBody>
-      </p:sp>
-      <p:sp>
-        <p:nvSpPr>
-          <p:cNvPr id="12" name="Accolade fermante 11"/>
-          <p:cNvSpPr/>
-          <p:nvPr/>
-        </p:nvSpPr>
-        <p:spPr>
-          <a:xfrm rot="16200000">
-            <a:off x="5363351" y="-559577"/>
-            <a:ext cx="1362634" cy="8797493"/>
-          </a:xfrm>
-          <a:prstGeom prst="rightBrace">
-            <a:avLst>
-              <a:gd name="adj1" fmla="val 86058"/>
-              <a:gd name="adj2" fmla="val 50000"/>
-            </a:avLst>
-          </a:prstGeom>
-        </p:spPr>
-        <p:style>
-          <a:lnRef idx="1">
-            <a:schemeClr val="accent1"/>
-          </a:lnRef>
-          <a:fillRef idx="0">
-            <a:schemeClr val="accent1"/>
-          </a:fillRef>
-          <a:effectRef idx="0">
-            <a:schemeClr val="accent1"/>
-          </a:effectRef>
-          <a:fontRef idx="minor">
-            <a:schemeClr val="tx1"/>
-          </a:fontRef>
-        </p:style>
-        <p:txBody>
-          <a:bodyPr rtlCol="0" anchor="ctr"/>
-          <a:lstStyle/>
-          <a:p>
-            <a:pPr algn="ctr"/>
-            <a:endParaRPr lang="fr-CH"/>
-          </a:p>
-        </p:txBody>
-      </p:sp>
     </p:spTree>
     <p:extLst>
       <p:ext uri="{BB962C8B-B14F-4D97-AF65-F5344CB8AC3E}">
-        <p14:creationId xmlns:p14="http://schemas.microsoft.com/office/powerpoint/2010/main" val="473884730"/>
+        <p14:creationId xmlns:p14="http://schemas.microsoft.com/office/powerpoint/2010/main" val="441191196"/>
       </p:ext>
     </p:extLst>
   </p:cSld>
@@ -15524,76 +15333,7 @@
           <a:p>
             <a:r>
               <a:rPr lang="fr-CH" dirty="0" err="1" smtClean="0"/>
-              <a:t>Extracted</a:t>
-            </a:r>
-            <a:r>
-              <a:rPr lang="fr-CH" dirty="0" smtClean="0"/>
-              <a:t> patterns</a:t>
-            </a:r>
-            <a:endParaRPr lang="fr-CH" dirty="0"/>
-          </a:p>
-        </p:txBody>
-      </p:sp>
-      <p:sp>
-        <p:nvSpPr>
-          <p:cNvPr id="3" name="Espace réservé du contenu 2"/>
-          <p:cNvSpPr>
-            <a:spLocks noGrp="1"/>
-          </p:cNvSpPr>
-          <p:nvPr>
-            <p:ph idx="1"/>
-          </p:nvPr>
-        </p:nvSpPr>
-        <p:spPr/>
-        <p:txBody>
-          <a:bodyPr>
-            <a:normAutofit/>
-          </a:bodyPr>
-          <a:lstStyle/>
-          <a:p>
-            <a:r>
-              <a:rPr lang="fr-CH" dirty="0"/>
-              <a:t>Protocol </a:t>
-            </a:r>
-            <a:r>
-              <a:rPr lang="fr-CH" dirty="0" err="1" smtClean="0"/>
-              <a:t>declaration</a:t>
-            </a:r>
-            <a:endParaRPr lang="fr-CH" dirty="0"/>
-          </a:p>
-          <a:p>
-            <a:r>
-              <a:rPr lang="fr-CH" dirty="0"/>
-              <a:t>Class </a:t>
-            </a:r>
-            <a:r>
-              <a:rPr lang="fr-CH" dirty="0" err="1"/>
-              <a:t>declaration</a:t>
-            </a:r>
-            <a:r>
-              <a:rPr lang="fr-CH" dirty="0"/>
-              <a:t> </a:t>
-            </a:r>
-          </a:p>
-          <a:p>
-            <a:r>
-              <a:rPr lang="fr-CH" dirty="0" err="1"/>
-              <a:t>Struct</a:t>
-            </a:r>
-            <a:r>
-              <a:rPr lang="fr-CH" dirty="0"/>
-              <a:t> </a:t>
-            </a:r>
-            <a:r>
-              <a:rPr lang="fr-CH" dirty="0" err="1" smtClean="0"/>
-              <a:t>declaration</a:t>
-            </a:r>
-            <a:endParaRPr lang="fr-CH" dirty="0"/>
-          </a:p>
-          <a:p>
-            <a:r>
-              <a:rPr lang="fr-CH" dirty="0" err="1" smtClean="0"/>
-              <a:t>Retroactive</a:t>
+              <a:t>Repository</a:t>
             </a:r>
             <a:r>
               <a:rPr lang="fr-CH" dirty="0" smtClean="0"/>
@@ -15601,59 +15341,8 @@
             </a:r>
             <a:r>
               <a:rPr lang="fr-CH" dirty="0" err="1" smtClean="0"/>
-              <a:t>modeling</a:t>
-            </a:r>
-            <a:endParaRPr lang="fr-CH" dirty="0" smtClean="0"/>
-          </a:p>
-          <a:p>
-            <a:r>
-              <a:rPr lang="fr-CH" dirty="0" smtClean="0"/>
-              <a:t>Protocol extension</a:t>
-            </a:r>
-          </a:p>
-          <a:p>
-            <a:r>
-              <a:rPr lang="fr-CH" dirty="0"/>
-              <a:t>Protocol </a:t>
-            </a:r>
-            <a:r>
-              <a:rPr lang="fr-CH" dirty="0" err="1"/>
-              <a:t>with</a:t>
-            </a:r>
-            <a:r>
-              <a:rPr lang="fr-CH" dirty="0"/>
-              <a:t> </a:t>
-            </a:r>
-            <a:r>
-              <a:rPr lang="fr-CH" dirty="0" err="1"/>
-              <a:t>associated</a:t>
-            </a:r>
-            <a:r>
-              <a:rPr lang="fr-CH" dirty="0"/>
-              <a:t> </a:t>
-            </a:r>
-            <a:r>
-              <a:rPr lang="fr-CH" dirty="0" err="1" smtClean="0"/>
-              <a:t>datatype</a:t>
-            </a:r>
-            <a:endParaRPr lang="fr-CH" dirty="0" smtClean="0"/>
-          </a:p>
-          <a:p>
-            <a:r>
-              <a:rPr lang="fr-CH" dirty="0" err="1" smtClean="0"/>
-              <a:t>Bounded</a:t>
-            </a:r>
-            <a:r>
-              <a:rPr lang="fr-CH" dirty="0" smtClean="0"/>
-              <a:t> </a:t>
-            </a:r>
-            <a:r>
-              <a:rPr lang="fr-CH" dirty="0" err="1" smtClean="0"/>
-              <a:t>polymorphism</a:t>
-            </a:r>
-            <a:endParaRPr lang="fr-CH" dirty="0" smtClean="0"/>
-          </a:p>
-          <a:p>
+              <a:t>choices</a:t>
+            </a:r>
             <a:endParaRPr lang="fr-CH" dirty="0"/>
           </a:p>
         </p:txBody>
@@ -15683,177 +15372,275 @@
       </p:sp>
       <p:sp>
         <p:nvSpPr>
-          <p:cNvPr id="5" name="Rectangle 4"/>
-          <p:cNvSpPr/>
+          <p:cNvPr id="5" name="ZoneTexte 4"/>
+          <p:cNvSpPr txBox="1"/>
           <p:nvPr/>
         </p:nvSpPr>
         <p:spPr>
           <a:xfrm>
-            <a:off x="6807855" y="1861457"/>
-            <a:ext cx="6096000" cy="2677656"/>
+            <a:off x="4177365" y="2094333"/>
+            <a:ext cx="1520792" cy="830997"/>
           </a:xfrm>
           <a:prstGeom prst="rect">
             <a:avLst/>
           </a:prstGeom>
+          <a:noFill/>
         </p:spPr>
         <p:txBody>
-          <a:bodyPr>
+          <a:bodyPr wrap="square" rtlCol="0">
             <a:spAutoFit/>
           </a:bodyPr>
           <a:lstStyle/>
           <a:p>
-            <a:pPr marL="342900" indent="-342900">
+            <a:r>
+              <a:rPr lang="fr-CH" sz="4800" b="1" dirty="0" smtClean="0"/>
+              <a:t>150</a:t>
+            </a:r>
+            <a:endParaRPr lang="fr-CH" sz="4800" b="1" dirty="0"/>
+          </a:p>
+        </p:txBody>
+      </p:sp>
+      <p:sp>
+        <p:nvSpPr>
+          <p:cNvPr id="6" name="ZoneTexte 5"/>
+          <p:cNvSpPr txBox="1"/>
+          <p:nvPr/>
+        </p:nvSpPr>
+        <p:spPr>
+          <a:xfrm>
+            <a:off x="5380522" y="2186665"/>
+            <a:ext cx="4543124" cy="646331"/>
+          </a:xfrm>
+          <a:prstGeom prst="rect">
+            <a:avLst/>
+          </a:prstGeom>
+          <a:noFill/>
+        </p:spPr>
+        <p:txBody>
+          <a:bodyPr wrap="square" rtlCol="0">
+            <a:spAutoFit/>
+          </a:bodyPr>
+          <a:lstStyle/>
+          <a:p>
+            <a:pPr marL="285750" indent="-285750">
               <a:buFont typeface="Arial" panose="020B0604020202020204" pitchFamily="34" charset="0"/>
               <a:buChar char="•"/>
             </a:pPr>
             <a:r>
-              <a:rPr lang="fr-CH" sz="2400" dirty="0" err="1" smtClean="0">
-                <a:latin typeface="Trebuchet MS" panose="020B0603020202020204" pitchFamily="34" charset="0"/>
-              </a:rPr>
-              <a:t>Optional</a:t>
-            </a:r>
-            <a:r>
-              <a:rPr lang="fr-CH" sz="2400" dirty="0" smtClean="0">
-                <a:latin typeface="Trebuchet MS" panose="020B0603020202020204" pitchFamily="34" charset="0"/>
-              </a:rPr>
-              <a:t> </a:t>
-            </a:r>
-            <a:r>
-              <a:rPr lang="fr-CH" sz="2400" dirty="0" err="1" smtClean="0">
-                <a:latin typeface="Trebuchet MS" panose="020B0603020202020204" pitchFamily="34" charset="0"/>
-              </a:rPr>
-              <a:t>chaining</a:t>
-            </a:r>
-            <a:endParaRPr lang="fr-CH" sz="2400" dirty="0" smtClean="0">
-              <a:latin typeface="Trebuchet MS" panose="020B0603020202020204" pitchFamily="34" charset="0"/>
-            </a:endParaRPr>
-          </a:p>
-          <a:p>
-            <a:pPr marL="342900" indent="-342900">
+              <a:rPr lang="fr-CH" dirty="0" smtClean="0"/>
+              <a:t>Swift</a:t>
+            </a:r>
+          </a:p>
+          <a:p>
+            <a:pPr marL="285750" indent="-285750">
               <a:buFont typeface="Arial" panose="020B0604020202020204" pitchFamily="34" charset="0"/>
               <a:buChar char="•"/>
             </a:pPr>
             <a:r>
-              <a:rPr lang="fr-CH" sz="2400" dirty="0" err="1">
-                <a:latin typeface="Trebuchet MS" panose="020B0603020202020204" pitchFamily="34" charset="0"/>
-              </a:rPr>
-              <a:t>Optionals</a:t>
-            </a:r>
-            <a:r>
-              <a:rPr lang="fr-CH" sz="2400" dirty="0">
-                <a:latin typeface="Trebuchet MS" panose="020B0603020202020204" pitchFamily="34" charset="0"/>
-              </a:rPr>
+              <a:rPr lang="fr-CH" dirty="0" err="1" smtClean="0"/>
+              <a:t>Descending</a:t>
+            </a:r>
+            <a:r>
+              <a:rPr lang="fr-CH" dirty="0" smtClean="0"/>
               <a:t> </a:t>
             </a:r>
-          </a:p>
-          <a:p>
-            <a:pPr marL="342900" indent="-342900">
+            <a:r>
+              <a:rPr lang="fr-CH" dirty="0" err="1" smtClean="0"/>
+              <a:t>order</a:t>
+            </a:r>
+            <a:r>
+              <a:rPr lang="fr-CH" dirty="0" smtClean="0"/>
+              <a:t> of stars</a:t>
+            </a:r>
+            <a:endParaRPr lang="fr-CH" dirty="0"/>
+          </a:p>
+        </p:txBody>
+      </p:sp>
+      <p:sp>
+        <p:nvSpPr>
+          <p:cNvPr id="7" name="ZoneTexte 6"/>
+          <p:cNvSpPr txBox="1"/>
+          <p:nvPr/>
+        </p:nvSpPr>
+        <p:spPr>
+          <a:xfrm>
+            <a:off x="2290811" y="4289655"/>
+            <a:ext cx="1520792" cy="830997"/>
+          </a:xfrm>
+          <a:prstGeom prst="rect">
+            <a:avLst/>
+          </a:prstGeom>
+          <a:noFill/>
+        </p:spPr>
+        <p:txBody>
+          <a:bodyPr wrap="square" rtlCol="0">
+            <a:spAutoFit/>
+          </a:bodyPr>
+          <a:lstStyle/>
+          <a:p>
+            <a:r>
+              <a:rPr lang="fr-CH" sz="4800" b="1" dirty="0" smtClean="0"/>
+              <a:t>27</a:t>
+            </a:r>
+            <a:endParaRPr lang="fr-CH" sz="4800" b="1" dirty="0"/>
+          </a:p>
+        </p:txBody>
+      </p:sp>
+      <p:sp>
+        <p:nvSpPr>
+          <p:cNvPr id="8" name="ZoneTexte 7"/>
+          <p:cNvSpPr txBox="1"/>
+          <p:nvPr/>
+        </p:nvSpPr>
+        <p:spPr>
+          <a:xfrm>
+            <a:off x="3136230" y="4520487"/>
+            <a:ext cx="1676400" cy="369332"/>
+          </a:xfrm>
+          <a:prstGeom prst="rect">
+            <a:avLst/>
+          </a:prstGeom>
+          <a:noFill/>
+        </p:spPr>
+        <p:txBody>
+          <a:bodyPr wrap="square" rtlCol="0">
+            <a:spAutoFit/>
+          </a:bodyPr>
+          <a:lstStyle/>
+          <a:p>
+            <a:pPr marL="285750" indent="-285750">
               <a:buFont typeface="Arial" panose="020B0604020202020204" pitchFamily="34" charset="0"/>
               <a:buChar char="•"/>
             </a:pPr>
             <a:r>
-              <a:rPr lang="fr-CH" sz="2400" dirty="0" err="1">
-                <a:latin typeface="Trebuchet MS" panose="020B0603020202020204" pitchFamily="34" charset="0"/>
-              </a:rPr>
-              <a:t>Inline</a:t>
-            </a:r>
-            <a:r>
-              <a:rPr lang="fr-CH" sz="2400" dirty="0">
-                <a:latin typeface="Trebuchet MS" panose="020B0603020202020204" pitchFamily="34" charset="0"/>
-              </a:rPr>
-              <a:t> </a:t>
-            </a:r>
-            <a:r>
-              <a:rPr lang="fr-CH" sz="2400" dirty="0" err="1" smtClean="0">
-                <a:latin typeface="Trebuchet MS" panose="020B0603020202020204" pitchFamily="34" charset="0"/>
-              </a:rPr>
-              <a:t>functions</a:t>
-            </a:r>
-            <a:endParaRPr lang="fr-CH" sz="2400" dirty="0" smtClean="0">
-              <a:latin typeface="Trebuchet MS" panose="020B0603020202020204" pitchFamily="34" charset="0"/>
-            </a:endParaRPr>
-          </a:p>
-          <a:p>
-            <a:pPr marL="342900" indent="-342900">
+              <a:rPr lang="fr-CH" dirty="0" err="1" smtClean="0"/>
+              <a:t>Filtered</a:t>
+            </a:r>
+            <a:r>
+              <a:rPr lang="fr-CH" dirty="0" smtClean="0"/>
+              <a:t> out</a:t>
+            </a:r>
+            <a:endParaRPr lang="fr-CH" dirty="0"/>
+          </a:p>
+        </p:txBody>
+      </p:sp>
+      <p:sp>
+        <p:nvSpPr>
+          <p:cNvPr id="9" name="ZoneTexte 8"/>
+          <p:cNvSpPr txBox="1"/>
+          <p:nvPr/>
+        </p:nvSpPr>
+        <p:spPr>
+          <a:xfrm>
+            <a:off x="6564423" y="4289655"/>
+            <a:ext cx="1520792" cy="830997"/>
+          </a:xfrm>
+          <a:prstGeom prst="rect">
+            <a:avLst/>
+          </a:prstGeom>
+          <a:noFill/>
+        </p:spPr>
+        <p:txBody>
+          <a:bodyPr wrap="square" rtlCol="0">
+            <a:spAutoFit/>
+          </a:bodyPr>
+          <a:lstStyle/>
+          <a:p>
+            <a:r>
+              <a:rPr lang="fr-CH" sz="4800" b="1" dirty="0" smtClean="0"/>
+              <a:t>123</a:t>
+            </a:r>
+            <a:endParaRPr lang="fr-CH" sz="4800" b="1" dirty="0"/>
+          </a:p>
+        </p:txBody>
+      </p:sp>
+      <p:sp>
+        <p:nvSpPr>
+          <p:cNvPr id="10" name="ZoneTexte 9"/>
+          <p:cNvSpPr txBox="1"/>
+          <p:nvPr/>
+        </p:nvSpPr>
+        <p:spPr>
+          <a:xfrm>
+            <a:off x="7665719" y="4520488"/>
+            <a:ext cx="1676400" cy="369332"/>
+          </a:xfrm>
+          <a:prstGeom prst="rect">
+            <a:avLst/>
+          </a:prstGeom>
+          <a:noFill/>
+        </p:spPr>
+        <p:txBody>
+          <a:bodyPr wrap="square" rtlCol="0">
+            <a:spAutoFit/>
+          </a:bodyPr>
+          <a:lstStyle/>
+          <a:p>
+            <a:pPr marL="285750" indent="-285750">
               <a:buFont typeface="Arial" panose="020B0604020202020204" pitchFamily="34" charset="0"/>
               <a:buChar char="•"/>
             </a:pPr>
             <a:r>
-              <a:rPr lang="fr-CH" sz="2400" dirty="0" err="1" smtClean="0">
-                <a:latin typeface="Trebuchet MS" panose="020B0603020202020204" pitchFamily="34" charset="0"/>
-              </a:rPr>
-              <a:t>Closure</a:t>
-            </a:r>
-            <a:endParaRPr lang="fr-CH" sz="2400" dirty="0" smtClean="0">
-              <a:latin typeface="Trebuchet MS" panose="020B0603020202020204" pitchFamily="34" charset="0"/>
-            </a:endParaRPr>
-          </a:p>
-          <a:p>
-            <a:pPr marL="342900" indent="-342900">
-              <a:buFont typeface="Arial" panose="020B0604020202020204" pitchFamily="34" charset="0"/>
-              <a:buChar char="•"/>
-            </a:pPr>
-            <a:r>
-              <a:rPr lang="fr-CH" sz="2400" dirty="0" err="1" smtClean="0">
-                <a:latin typeface="Trebuchet MS" panose="020B0603020202020204" pitchFamily="34" charset="0"/>
-              </a:rPr>
-              <a:t>Infered</a:t>
-            </a:r>
-            <a:r>
-              <a:rPr lang="fr-CH" sz="2400" dirty="0" smtClean="0">
-                <a:latin typeface="Trebuchet MS" panose="020B0603020202020204" pitchFamily="34" charset="0"/>
-              </a:rPr>
-              <a:t> types</a:t>
-            </a:r>
-          </a:p>
-          <a:p>
-            <a:pPr marL="342900" indent="-342900">
-              <a:buFont typeface="Arial" panose="020B0604020202020204" pitchFamily="34" charset="0"/>
-              <a:buChar char="•"/>
-            </a:pPr>
-            <a:r>
-              <a:rPr lang="fr-CH" sz="2400" dirty="0" smtClean="0">
-                <a:latin typeface="Trebuchet MS" panose="020B0603020202020204" pitchFamily="34" charset="0"/>
-              </a:rPr>
-              <a:t>Variable </a:t>
-            </a:r>
-            <a:r>
-              <a:rPr lang="fr-CH" sz="2400" dirty="0" err="1" smtClean="0">
-                <a:latin typeface="Trebuchet MS" panose="020B0603020202020204" pitchFamily="34" charset="0"/>
-              </a:rPr>
-              <a:t>declaration</a:t>
-            </a:r>
-            <a:endParaRPr lang="fr-CH" sz="2400" dirty="0" smtClean="0">
-              <a:latin typeface="Trebuchet MS" panose="020B0603020202020204" pitchFamily="34" charset="0"/>
-            </a:endParaRPr>
-          </a:p>
-          <a:p>
-            <a:pPr marL="342900" indent="-342900">
-              <a:buFont typeface="Arial" panose="020B0604020202020204" pitchFamily="34" charset="0"/>
-              <a:buChar char="•"/>
-            </a:pPr>
-            <a:r>
-              <a:rPr lang="fr-CH" sz="2400" dirty="0" smtClean="0">
-                <a:latin typeface="Trebuchet MS" panose="020B0603020202020204" pitchFamily="34" charset="0"/>
-              </a:rPr>
-              <a:t>Constant </a:t>
-            </a:r>
-            <a:r>
-              <a:rPr lang="fr-CH" sz="2400" dirty="0" err="1" smtClean="0">
-                <a:latin typeface="Trebuchet MS" panose="020B0603020202020204" pitchFamily="34" charset="0"/>
-              </a:rPr>
-              <a:t>declaration</a:t>
-            </a:r>
-            <a:endParaRPr lang="fr-CH" sz="2400" dirty="0">
-              <a:latin typeface="Trebuchet MS" panose="020B0603020202020204" pitchFamily="34" charset="0"/>
-            </a:endParaRPr>
+              <a:rPr lang="fr-CH" dirty="0" err="1" smtClean="0"/>
+              <a:t>Projects</a:t>
+            </a:r>
+            <a:r>
+              <a:rPr lang="fr-CH" dirty="0" smtClean="0"/>
+              <a:t> </a:t>
+            </a:r>
+            <a:r>
+              <a:rPr lang="fr-CH" dirty="0" err="1" smtClean="0"/>
+              <a:t>left</a:t>
+            </a:r>
+            <a:endParaRPr lang="fr-CH" dirty="0"/>
+          </a:p>
+        </p:txBody>
+      </p:sp>
+      <p:sp>
+        <p:nvSpPr>
+          <p:cNvPr id="12" name="Accolade fermante 11"/>
+          <p:cNvSpPr/>
+          <p:nvPr/>
+        </p:nvSpPr>
+        <p:spPr>
+          <a:xfrm rot="16200000">
+            <a:off x="5363351" y="-559577"/>
+            <a:ext cx="1362634" cy="8797493"/>
+          </a:xfrm>
+          <a:prstGeom prst="rightBrace">
+            <a:avLst>
+              <a:gd name="adj1" fmla="val 86058"/>
+              <a:gd name="adj2" fmla="val 50000"/>
+            </a:avLst>
+          </a:prstGeom>
+        </p:spPr>
+        <p:style>
+          <a:lnRef idx="1">
+            <a:schemeClr val="accent1"/>
+          </a:lnRef>
+          <a:fillRef idx="0">
+            <a:schemeClr val="accent1"/>
+          </a:fillRef>
+          <a:effectRef idx="0">
+            <a:schemeClr val="accent1"/>
+          </a:effectRef>
+          <a:fontRef idx="minor">
+            <a:schemeClr val="tx1"/>
+          </a:fontRef>
+        </p:style>
+        <p:txBody>
+          <a:bodyPr rtlCol="0" anchor="ctr"/>
+          <a:lstStyle/>
+          <a:p>
+            <a:pPr algn="ctr"/>
+            <a:endParaRPr lang="fr-CH"/>
           </a:p>
         </p:txBody>
       </p:sp>
     </p:spTree>
     <p:extLst>
       <p:ext uri="{BB962C8B-B14F-4D97-AF65-F5344CB8AC3E}">
-        <p14:creationId xmlns:p14="http://schemas.microsoft.com/office/powerpoint/2010/main" val="3882003861"/>
+        <p14:creationId xmlns:p14="http://schemas.microsoft.com/office/powerpoint/2010/main" val="473884730"/>
       </p:ext>
     </p:extLst>
   </p:cSld>
@@ -15894,7 +15681,7 @@
             <a:spLocks noGrp="1"/>
           </p:cNvSpPr>
           <p:nvPr>
-            <p:ph type="ctrTitle"/>
+            <p:ph type="title"/>
           </p:nvPr>
         </p:nvSpPr>
         <p:spPr/>
@@ -15904,7 +15691,11 @@
           <a:p>
             <a:r>
               <a:rPr lang="fr-CH" dirty="0" err="1" smtClean="0"/>
-              <a:t>Results</a:t>
+              <a:t>Extracted</a:t>
+            </a:r>
+            <a:r>
+              <a:rPr lang="fr-CH" dirty="0" smtClean="0"/>
+              <a:t> patterns</a:t>
             </a:r>
             <a:endParaRPr lang="fr-CH" dirty="0"/>
           </a:p>
@@ -15912,20 +15703,125 @@
       </p:sp>
       <p:sp>
         <p:nvSpPr>
-          <p:cNvPr id="3" name="Sous-titre 2"/>
-          <p:cNvSpPr>
-            <a:spLocks noGrp="1"/>
-          </p:cNvSpPr>
-          <p:nvPr>
-            <p:ph type="subTitle" idx="1"/>
+          <p:cNvPr id="3" name="Espace réservé du contenu 2"/>
+          <p:cNvSpPr>
+            <a:spLocks noGrp="1"/>
+          </p:cNvSpPr>
+          <p:nvPr>
+            <p:ph idx="1"/>
           </p:nvPr>
         </p:nvSpPr>
         <p:spPr/>
         <p:txBody>
-          <a:bodyPr/>
-          <a:lstStyle/>
-          <a:p>
-            <a:endParaRPr lang="fr-CH"/>
+          <a:bodyPr>
+            <a:normAutofit/>
+          </a:bodyPr>
+          <a:lstStyle/>
+          <a:p>
+            <a:r>
+              <a:rPr lang="fr-CH" dirty="0"/>
+              <a:t>Protocol </a:t>
+            </a:r>
+            <a:r>
+              <a:rPr lang="fr-CH" dirty="0" err="1" smtClean="0"/>
+              <a:t>declaration</a:t>
+            </a:r>
+            <a:endParaRPr lang="fr-CH" dirty="0"/>
+          </a:p>
+          <a:p>
+            <a:r>
+              <a:rPr lang="fr-CH" dirty="0"/>
+              <a:t>Class </a:t>
+            </a:r>
+            <a:r>
+              <a:rPr lang="fr-CH" dirty="0" err="1"/>
+              <a:t>declaration</a:t>
+            </a:r>
+            <a:r>
+              <a:rPr lang="fr-CH" dirty="0"/>
+              <a:t> </a:t>
+            </a:r>
+          </a:p>
+          <a:p>
+            <a:r>
+              <a:rPr lang="fr-CH" dirty="0" err="1"/>
+              <a:t>Struct</a:t>
+            </a:r>
+            <a:r>
+              <a:rPr lang="fr-CH" dirty="0"/>
+              <a:t> </a:t>
+            </a:r>
+            <a:r>
+              <a:rPr lang="fr-CH" dirty="0" err="1" smtClean="0"/>
+              <a:t>declaration</a:t>
+            </a:r>
+            <a:endParaRPr lang="fr-CH" dirty="0"/>
+          </a:p>
+          <a:p>
+            <a:r>
+              <a:rPr lang="fr-CH" dirty="0" err="1" smtClean="0"/>
+              <a:t>Retroactive</a:t>
+            </a:r>
+            <a:r>
+              <a:rPr lang="fr-CH" dirty="0" smtClean="0"/>
+              <a:t> </a:t>
+            </a:r>
+            <a:r>
+              <a:rPr lang="fr-CH" dirty="0" err="1" smtClean="0"/>
+              <a:t>modeling</a:t>
+            </a:r>
+            <a:endParaRPr lang="fr-CH" dirty="0" smtClean="0"/>
+          </a:p>
+          <a:p>
+            <a:r>
+              <a:rPr lang="fr-CH" dirty="0" smtClean="0"/>
+              <a:t>Protocol extension</a:t>
+            </a:r>
+          </a:p>
+          <a:p>
+            <a:r>
+              <a:rPr lang="fr-CH" dirty="0"/>
+              <a:t>Protocol </a:t>
+            </a:r>
+            <a:r>
+              <a:rPr lang="fr-CH" dirty="0" err="1"/>
+              <a:t>with</a:t>
+            </a:r>
+            <a:r>
+              <a:rPr lang="fr-CH" dirty="0"/>
+              <a:t> </a:t>
+            </a:r>
+            <a:r>
+              <a:rPr lang="fr-CH" dirty="0" err="1"/>
+              <a:t>associated</a:t>
+            </a:r>
+            <a:r>
+              <a:rPr lang="fr-CH" dirty="0"/>
+              <a:t> </a:t>
+            </a:r>
+            <a:r>
+              <a:rPr lang="fr-CH" dirty="0" err="1" smtClean="0"/>
+              <a:t>datatype</a:t>
+            </a:r>
+            <a:endParaRPr lang="fr-CH" dirty="0" smtClean="0"/>
+          </a:p>
+          <a:p>
+            <a:r>
+              <a:rPr lang="fr-CH" dirty="0" err="1" smtClean="0"/>
+              <a:t>Bounded</a:t>
+            </a:r>
+            <a:r>
+              <a:rPr lang="fr-CH" dirty="0" smtClean="0"/>
+              <a:t> </a:t>
+            </a:r>
+            <a:r>
+              <a:rPr lang="fr-CH" dirty="0" err="1" smtClean="0"/>
+              <a:t>polymorphism</a:t>
+            </a:r>
+            <a:endParaRPr lang="fr-CH" dirty="0" smtClean="0"/>
+          </a:p>
+          <a:p>
+            <a:endParaRPr lang="fr-CH" dirty="0"/>
           </a:p>
         </p:txBody>
       </p:sp>
@@ -15952,10 +15848,179 @@
           </a:p>
         </p:txBody>
       </p:sp>
+      <p:sp>
+        <p:nvSpPr>
+          <p:cNvPr id="5" name="Rectangle 4"/>
+          <p:cNvSpPr/>
+          <p:nvPr/>
+        </p:nvSpPr>
+        <p:spPr>
+          <a:xfrm>
+            <a:off x="6807855" y="1861457"/>
+            <a:ext cx="6096000" cy="2677656"/>
+          </a:xfrm>
+          <a:prstGeom prst="rect">
+            <a:avLst/>
+          </a:prstGeom>
+        </p:spPr>
+        <p:txBody>
+          <a:bodyPr>
+            <a:spAutoFit/>
+          </a:bodyPr>
+          <a:lstStyle/>
+          <a:p>
+            <a:pPr marL="342900" indent="-342900">
+              <a:buFont typeface="Arial" panose="020B0604020202020204" pitchFamily="34" charset="0"/>
+              <a:buChar char="•"/>
+            </a:pPr>
+            <a:r>
+              <a:rPr lang="fr-CH" sz="2400" dirty="0" err="1" smtClean="0">
+                <a:latin typeface="Trebuchet MS" panose="020B0603020202020204" pitchFamily="34" charset="0"/>
+              </a:rPr>
+              <a:t>Optional</a:t>
+            </a:r>
+            <a:r>
+              <a:rPr lang="fr-CH" sz="2400" dirty="0" smtClean="0">
+                <a:latin typeface="Trebuchet MS" panose="020B0603020202020204" pitchFamily="34" charset="0"/>
+              </a:rPr>
+              <a:t> </a:t>
+            </a:r>
+            <a:r>
+              <a:rPr lang="fr-CH" sz="2400" dirty="0" err="1" smtClean="0">
+                <a:latin typeface="Trebuchet MS" panose="020B0603020202020204" pitchFamily="34" charset="0"/>
+              </a:rPr>
+              <a:t>chaining</a:t>
+            </a:r>
+            <a:endParaRPr lang="fr-CH" sz="2400" dirty="0" smtClean="0">
+              <a:latin typeface="Trebuchet MS" panose="020B0603020202020204" pitchFamily="34" charset="0"/>
+            </a:endParaRPr>
+          </a:p>
+          <a:p>
+            <a:pPr marL="342900" indent="-342900">
+              <a:buFont typeface="Arial" panose="020B0604020202020204" pitchFamily="34" charset="0"/>
+              <a:buChar char="•"/>
+            </a:pPr>
+            <a:r>
+              <a:rPr lang="fr-CH" sz="2400" dirty="0" err="1">
+                <a:latin typeface="Trebuchet MS" panose="020B0603020202020204" pitchFamily="34" charset="0"/>
+              </a:rPr>
+              <a:t>Optionals</a:t>
+            </a:r>
+            <a:r>
+              <a:rPr lang="fr-CH" sz="2400" dirty="0">
+                <a:latin typeface="Trebuchet MS" panose="020B0603020202020204" pitchFamily="34" charset="0"/>
+              </a:rPr>
+              <a:t> </a:t>
+            </a:r>
+          </a:p>
+          <a:p>
+            <a:pPr marL="342900" indent="-342900">
+              <a:buFont typeface="Arial" panose="020B0604020202020204" pitchFamily="34" charset="0"/>
+              <a:buChar char="•"/>
+            </a:pPr>
+            <a:r>
+              <a:rPr lang="fr-CH" sz="2400" dirty="0" err="1">
+                <a:latin typeface="Trebuchet MS" panose="020B0603020202020204" pitchFamily="34" charset="0"/>
+              </a:rPr>
+              <a:t>Inline</a:t>
+            </a:r>
+            <a:r>
+              <a:rPr lang="fr-CH" sz="2400" dirty="0">
+                <a:latin typeface="Trebuchet MS" panose="020B0603020202020204" pitchFamily="34" charset="0"/>
+              </a:rPr>
+              <a:t> </a:t>
+            </a:r>
+            <a:r>
+              <a:rPr lang="fr-CH" sz="2400" dirty="0" err="1" smtClean="0">
+                <a:latin typeface="Trebuchet MS" panose="020B0603020202020204" pitchFamily="34" charset="0"/>
+              </a:rPr>
+              <a:t>functions</a:t>
+            </a:r>
+            <a:endParaRPr lang="fr-CH" sz="2400" dirty="0" smtClean="0">
+              <a:latin typeface="Trebuchet MS" panose="020B0603020202020204" pitchFamily="34" charset="0"/>
+            </a:endParaRPr>
+          </a:p>
+          <a:p>
+            <a:pPr marL="342900" indent="-342900">
+              <a:buFont typeface="Arial" panose="020B0604020202020204" pitchFamily="34" charset="0"/>
+              <a:buChar char="•"/>
+            </a:pPr>
+            <a:r>
+              <a:rPr lang="fr-CH" sz="2400" dirty="0" err="1" smtClean="0">
+                <a:latin typeface="Trebuchet MS" panose="020B0603020202020204" pitchFamily="34" charset="0"/>
+              </a:rPr>
+              <a:t>Closure</a:t>
+            </a:r>
+            <a:endParaRPr lang="fr-CH" sz="2400" dirty="0" smtClean="0">
+              <a:latin typeface="Trebuchet MS" panose="020B0603020202020204" pitchFamily="34" charset="0"/>
+            </a:endParaRPr>
+          </a:p>
+          <a:p>
+            <a:pPr marL="342900" indent="-342900">
+              <a:buFont typeface="Arial" panose="020B0604020202020204" pitchFamily="34" charset="0"/>
+              <a:buChar char="•"/>
+            </a:pPr>
+            <a:r>
+              <a:rPr lang="fr-CH" sz="2400" dirty="0" err="1" smtClean="0">
+                <a:latin typeface="Trebuchet MS" panose="020B0603020202020204" pitchFamily="34" charset="0"/>
+              </a:rPr>
+              <a:t>Infered</a:t>
+            </a:r>
+            <a:r>
+              <a:rPr lang="fr-CH" sz="2400" dirty="0" smtClean="0">
+                <a:latin typeface="Trebuchet MS" panose="020B0603020202020204" pitchFamily="34" charset="0"/>
+              </a:rPr>
+              <a:t> types</a:t>
+            </a:r>
+          </a:p>
+          <a:p>
+            <a:pPr marL="342900" indent="-342900">
+              <a:buFont typeface="Arial" panose="020B0604020202020204" pitchFamily="34" charset="0"/>
+              <a:buChar char="•"/>
+            </a:pPr>
+            <a:r>
+              <a:rPr lang="fr-CH" sz="2400" dirty="0" smtClean="0">
+                <a:latin typeface="Trebuchet MS" panose="020B0603020202020204" pitchFamily="34" charset="0"/>
+              </a:rPr>
+              <a:t>Variable </a:t>
+            </a:r>
+            <a:r>
+              <a:rPr lang="fr-CH" sz="2400" dirty="0" err="1" smtClean="0">
+                <a:latin typeface="Trebuchet MS" panose="020B0603020202020204" pitchFamily="34" charset="0"/>
+              </a:rPr>
+              <a:t>declaration</a:t>
+            </a:r>
+            <a:endParaRPr lang="fr-CH" sz="2400" dirty="0" smtClean="0">
+              <a:latin typeface="Trebuchet MS" panose="020B0603020202020204" pitchFamily="34" charset="0"/>
+            </a:endParaRPr>
+          </a:p>
+          <a:p>
+            <a:pPr marL="342900" indent="-342900">
+              <a:buFont typeface="Arial" panose="020B0604020202020204" pitchFamily="34" charset="0"/>
+              <a:buChar char="•"/>
+            </a:pPr>
+            <a:r>
+              <a:rPr lang="fr-CH" sz="2400" dirty="0" smtClean="0">
+                <a:latin typeface="Trebuchet MS" panose="020B0603020202020204" pitchFamily="34" charset="0"/>
+              </a:rPr>
+              <a:t>Constant </a:t>
+            </a:r>
+            <a:r>
+              <a:rPr lang="fr-CH" sz="2400" dirty="0" err="1" smtClean="0">
+                <a:latin typeface="Trebuchet MS" panose="020B0603020202020204" pitchFamily="34" charset="0"/>
+              </a:rPr>
+              <a:t>declaration</a:t>
+            </a:r>
+            <a:endParaRPr lang="fr-CH" sz="2400" dirty="0">
+              <a:latin typeface="Trebuchet MS" panose="020B0603020202020204" pitchFamily="34" charset="0"/>
+            </a:endParaRPr>
+          </a:p>
+        </p:txBody>
+      </p:sp>
     </p:spTree>
     <p:extLst>
       <p:ext uri="{BB962C8B-B14F-4D97-AF65-F5344CB8AC3E}">
-        <p14:creationId xmlns:p14="http://schemas.microsoft.com/office/powerpoint/2010/main" val="1882605588"/>
+        <p14:creationId xmlns:p14="http://schemas.microsoft.com/office/powerpoint/2010/main" val="3882003861"/>
       </p:ext>
     </p:extLst>
   </p:cSld>
@@ -15996,7 +16061,7 @@
             <a:spLocks noGrp="1"/>
           </p:cNvSpPr>
           <p:nvPr>
-            <p:ph type="title"/>
+            <p:ph type="ctrTitle"/>
           </p:nvPr>
         </p:nvSpPr>
         <p:spPr/>
@@ -16012,31 +16077,25 @@
           </a:p>
         </p:txBody>
       </p:sp>
-      <p:graphicFrame>
-        <p:nvGraphicFramePr>
-          <p:cNvPr id="7" name="Espace réservé du contenu 6"/>
-          <p:cNvGraphicFramePr>
-            <a:graphicFrameLocks noGrp="1"/>
-          </p:cNvGraphicFramePr>
-          <p:nvPr>
-            <p:ph idx="1"/>
-            <p:extLst>
-              <p:ext uri="{D42A27DB-BD31-4B8C-83A1-F6EECF244321}">
-                <p14:modId xmlns:p14="http://schemas.microsoft.com/office/powerpoint/2010/main" val="3951230734"/>
-              </p:ext>
-            </p:extLst>
-          </p:nvPr>
-        </p:nvGraphicFramePr>
-        <p:xfrm>
-          <a:off x="502508" y="1227438"/>
-          <a:ext cx="10140778" cy="5494037"/>
-        </p:xfrm>
-        <a:graphic>
-          <a:graphicData uri="http://schemas.openxmlformats.org/drawingml/2006/chart">
-            <c:chart xmlns:c="http://schemas.openxmlformats.org/drawingml/2006/chart" xmlns:r="http://schemas.openxmlformats.org/officeDocument/2006/relationships" r:id="rId2"/>
-          </a:graphicData>
-        </a:graphic>
-      </p:graphicFrame>
+      <p:sp>
+        <p:nvSpPr>
+          <p:cNvPr id="3" name="Sous-titre 2"/>
+          <p:cNvSpPr>
+            <a:spLocks noGrp="1"/>
+          </p:cNvSpPr>
+          <p:nvPr>
+            <p:ph type="subTitle" idx="1"/>
+          </p:nvPr>
+        </p:nvSpPr>
+        <p:spPr/>
+        <p:txBody>
+          <a:bodyPr/>
+          <a:lstStyle/>
+          <a:p>
+            <a:endParaRPr lang="fr-CH"/>
+          </a:p>
+        </p:txBody>
+      </p:sp>
       <p:sp>
         <p:nvSpPr>
           <p:cNvPr id="4" name="Espace réservé du numéro de diapositive 3"/>
@@ -16063,7 +16122,7 @@
     </p:spTree>
     <p:extLst>
       <p:ext uri="{BB962C8B-B14F-4D97-AF65-F5344CB8AC3E}">
-        <p14:creationId xmlns:p14="http://schemas.microsoft.com/office/powerpoint/2010/main" val="1105297126"/>
+        <p14:creationId xmlns:p14="http://schemas.microsoft.com/office/powerpoint/2010/main" val="1882605588"/>
       </p:ext>
     </p:extLst>
   </p:cSld>
@@ -16130,14 +16189,14 @@
             <p:ph idx="1"/>
             <p:extLst>
               <p:ext uri="{D42A27DB-BD31-4B8C-83A1-F6EECF244321}">
-                <p14:modId xmlns:p14="http://schemas.microsoft.com/office/powerpoint/2010/main" val="2716214168"/>
+                <p14:modId xmlns:p14="http://schemas.microsoft.com/office/powerpoint/2010/main" val="3951230734"/>
               </p:ext>
             </p:extLst>
           </p:nvPr>
         </p:nvGraphicFramePr>
         <p:xfrm>
-          <a:off x="677863" y="1318054"/>
-          <a:ext cx="9454678" cy="4723971"/>
+          <a:off x="502508" y="1227438"/>
+          <a:ext cx="10140778" cy="5494037"/>
         </p:xfrm>
         <a:graphic>
           <a:graphicData uri="http://schemas.openxmlformats.org/drawingml/2006/chart">
@@ -16171,7 +16230,7 @@
     </p:spTree>
     <p:extLst>
       <p:ext uri="{BB962C8B-B14F-4D97-AF65-F5344CB8AC3E}">
-        <p14:creationId xmlns:p14="http://schemas.microsoft.com/office/powerpoint/2010/main" val="2837540301"/>
+        <p14:creationId xmlns:p14="http://schemas.microsoft.com/office/powerpoint/2010/main" val="1105297126"/>
       </p:ext>
     </p:extLst>
   </p:cSld>
@@ -16238,7 +16297,7 @@
             <p:ph idx="1"/>
             <p:extLst>
               <p:ext uri="{D42A27DB-BD31-4B8C-83A1-F6EECF244321}">
-                <p14:modId xmlns:p14="http://schemas.microsoft.com/office/powerpoint/2010/main" val="3534903920"/>
+                <p14:modId xmlns:p14="http://schemas.microsoft.com/office/powerpoint/2010/main" val="2716214168"/>
               </p:ext>
             </p:extLst>
           </p:nvPr>
@@ -16279,7 +16338,7 @@
     </p:spTree>
     <p:extLst>
       <p:ext uri="{BB962C8B-B14F-4D97-AF65-F5344CB8AC3E}">
-        <p14:creationId xmlns:p14="http://schemas.microsoft.com/office/powerpoint/2010/main" val="382655199"/>
+        <p14:creationId xmlns:p14="http://schemas.microsoft.com/office/powerpoint/2010/main" val="2837540301"/>
       </p:ext>
     </p:extLst>
   </p:cSld>
@@ -16542,62 +16601,38 @@
           <a:lstStyle/>
           <a:p>
             <a:r>
-              <a:rPr lang="fr-CH" dirty="0" smtClean="0"/>
-              <a:t>Evolution of </a:t>
-            </a:r>
-            <a:r>
               <a:rPr lang="fr-CH" dirty="0" err="1" smtClean="0"/>
-              <a:t>specific</a:t>
-            </a:r>
-            <a:r>
-              <a:rPr lang="fr-CH" dirty="0" smtClean="0"/>
-              <a:t> </a:t>
-            </a:r>
-            <a:r>
-              <a:rPr lang="fr-CH" dirty="0" err="1" smtClean="0"/>
-              <a:t>feature</a:t>
-            </a:r>
-            <a:r>
-              <a:rPr lang="fr-CH" dirty="0" smtClean="0"/>
-              <a:t> in </a:t>
-            </a:r>
-            <a:r>
-              <a:rPr lang="fr-CH" dirty="0" err="1" smtClean="0"/>
-              <a:t>project</a:t>
+              <a:t>Results</a:t>
             </a:r>
             <a:endParaRPr lang="fr-CH" dirty="0"/>
           </a:p>
         </p:txBody>
       </p:sp>
-      <p:pic>
-        <p:nvPicPr>
-          <p:cNvPr id="5" name="Espace réservé du contenu 4"/>
-          <p:cNvPicPr>
-            <a:picLocks noGrp="1" noChangeAspect="1"/>
-          </p:cNvPicPr>
+      <p:graphicFrame>
+        <p:nvGraphicFramePr>
+          <p:cNvPr id="7" name="Espace réservé du contenu 6"/>
+          <p:cNvGraphicFramePr>
+            <a:graphicFrameLocks noGrp="1"/>
+          </p:cNvGraphicFramePr>
           <p:nvPr>
             <p:ph idx="1"/>
-          </p:nvPr>
-        </p:nvPicPr>
-        <p:blipFill>
-          <a:blip r:embed="rId2">
-            <a:extLst>
-              <a:ext uri="{28A0092B-C50C-407E-A947-70E740481C1C}">
-                <a14:useLocalDpi xmlns:a14="http://schemas.microsoft.com/office/drawing/2010/main" val="0"/>
-              </a:ext>
-            </a:extLst>
-          </a:blip>
-          <a:stretch>
-            <a:fillRect/>
-          </a:stretch>
-        </p:blipFill>
-        <p:spPr>
-          <a:xfrm>
-            <a:off x="3318012" y="1804473"/>
-            <a:ext cx="5573182" cy="4179887"/>
-          </a:xfrm>
-        </p:spPr>
-      </p:pic>
+            <p:extLst>
+              <p:ext uri="{D42A27DB-BD31-4B8C-83A1-F6EECF244321}">
+                <p14:modId xmlns:p14="http://schemas.microsoft.com/office/powerpoint/2010/main" val="3534903920"/>
+              </p:ext>
+            </p:extLst>
+          </p:nvPr>
+        </p:nvGraphicFramePr>
+        <p:xfrm>
+          <a:off x="677863" y="1318054"/>
+          <a:ext cx="9454678" cy="4723971"/>
+        </p:xfrm>
+        <a:graphic>
+          <a:graphicData uri="http://schemas.openxmlformats.org/drawingml/2006/chart">
+            <c:chart xmlns:c="http://schemas.openxmlformats.org/drawingml/2006/chart" xmlns:r="http://schemas.openxmlformats.org/officeDocument/2006/relationships" r:id="rId2"/>
+          </a:graphicData>
+        </a:graphic>
+      </p:graphicFrame>
       <p:sp>
         <p:nvSpPr>
           <p:cNvPr id="4" name="Espace réservé du numéro de diapositive 3"/>
@@ -16624,7 +16659,7 @@
     </p:spTree>
     <p:extLst>
       <p:ext uri="{BB962C8B-B14F-4D97-AF65-F5344CB8AC3E}">
-        <p14:creationId xmlns:p14="http://schemas.microsoft.com/office/powerpoint/2010/main" val="304126981"/>
+        <p14:creationId xmlns:p14="http://schemas.microsoft.com/office/powerpoint/2010/main" val="382655199"/>
       </p:ext>
     </p:extLst>
   </p:cSld>
@@ -16675,6 +16710,138 @@
           <a:p>
             <a:r>
               <a:rPr lang="fr-CH" dirty="0" smtClean="0"/>
+              <a:t>Evolution of </a:t>
+            </a:r>
+            <a:r>
+              <a:rPr lang="fr-CH" dirty="0" err="1" smtClean="0"/>
+              <a:t>specific</a:t>
+            </a:r>
+            <a:r>
+              <a:rPr lang="fr-CH" dirty="0" smtClean="0"/>
+              <a:t> </a:t>
+            </a:r>
+            <a:r>
+              <a:rPr lang="fr-CH" dirty="0" err="1" smtClean="0"/>
+              <a:t>feature</a:t>
+            </a:r>
+            <a:r>
+              <a:rPr lang="fr-CH" dirty="0" smtClean="0"/>
+              <a:t> in </a:t>
+            </a:r>
+            <a:r>
+              <a:rPr lang="fr-CH" dirty="0" err="1" smtClean="0"/>
+              <a:t>project</a:t>
+            </a:r>
+            <a:endParaRPr lang="fr-CH" dirty="0"/>
+          </a:p>
+        </p:txBody>
+      </p:sp>
+      <p:pic>
+        <p:nvPicPr>
+          <p:cNvPr id="5" name="Espace réservé du contenu 4"/>
+          <p:cNvPicPr>
+            <a:picLocks noGrp="1" noChangeAspect="1"/>
+          </p:cNvPicPr>
+          <p:nvPr>
+            <p:ph idx="1"/>
+          </p:nvPr>
+        </p:nvPicPr>
+        <p:blipFill>
+          <a:blip r:embed="rId2">
+            <a:extLst>
+              <a:ext uri="{28A0092B-C50C-407E-A947-70E740481C1C}">
+                <a14:useLocalDpi xmlns:a14="http://schemas.microsoft.com/office/drawing/2010/main" val="0"/>
+              </a:ext>
+            </a:extLst>
+          </a:blip>
+          <a:stretch>
+            <a:fillRect/>
+          </a:stretch>
+        </p:blipFill>
+        <p:spPr>
+          <a:xfrm>
+            <a:off x="3318012" y="1804473"/>
+            <a:ext cx="5573182" cy="4179887"/>
+          </a:xfrm>
+        </p:spPr>
+      </p:pic>
+      <p:sp>
+        <p:nvSpPr>
+          <p:cNvPr id="4" name="Espace réservé du numéro de diapositive 3"/>
+          <p:cNvSpPr>
+            <a:spLocks noGrp="1"/>
+          </p:cNvSpPr>
+          <p:nvPr>
+            <p:ph type="sldNum" sz="quarter" idx="12"/>
+          </p:nvPr>
+        </p:nvSpPr>
+        <p:spPr/>
+        <p:txBody>
+          <a:bodyPr/>
+          <a:lstStyle/>
+          <a:p>
+            <a:fld id="{F60449C3-8BCD-4455-8E2A-A866209B9601}" type="slidenum">
+              <a:rPr lang="fr-CH" smtClean="0"/>
+              <a:t>21</a:t>
+            </a:fld>
+            <a:endParaRPr lang="fr-CH"/>
+          </a:p>
+        </p:txBody>
+      </p:sp>
+    </p:spTree>
+    <p:extLst>
+      <p:ext uri="{BB962C8B-B14F-4D97-AF65-F5344CB8AC3E}">
+        <p14:creationId xmlns:p14="http://schemas.microsoft.com/office/powerpoint/2010/main" val="304126981"/>
+      </p:ext>
+    </p:extLst>
+  </p:cSld>
+  <p:clrMapOvr>
+    <a:masterClrMapping/>
+  </p:clrMapOvr>
+  <p:timing>
+    <p:tnLst>
+      <p:par>
+        <p:cTn id="1" dur="indefinite" restart="never" nodeType="tmRoot"/>
+      </p:par>
+    </p:tnLst>
+  </p:timing>
+</p:sld>
+</file>
+
+<file path=ppt/slides/slide22.xml><?xml version="1.0" encoding="utf-8"?>
+<p:sld xmlns:a="http://schemas.openxmlformats.org/drawingml/2006/main" xmlns:r="http://schemas.openxmlformats.org/officeDocument/2006/relationships" xmlns:p="http://schemas.openxmlformats.org/presentationml/2006/main">
+  <p:cSld>
+    <p:spTree>
+      <p:nvGrpSpPr>
+        <p:cNvPr id="1" name=""/>
+        <p:cNvGrpSpPr/>
+        <p:nvPr/>
+      </p:nvGrpSpPr>
+      <p:grpSpPr>
+        <a:xfrm>
+          <a:off x="0" y="0"/>
+          <a:ext cx="0" cy="0"/>
+          <a:chOff x="0" y="0"/>
+          <a:chExt cx="0" cy="0"/>
+        </a:xfrm>
+      </p:grpSpPr>
+      <p:sp>
+        <p:nvSpPr>
+          <p:cNvPr id="2" name="Titre 1"/>
+          <p:cNvSpPr>
+            <a:spLocks noGrp="1"/>
+          </p:cNvSpPr>
+          <p:nvPr>
+            <p:ph type="title"/>
+          </p:nvPr>
+        </p:nvSpPr>
+        <p:spPr/>
+        <p:txBody>
+          <a:bodyPr/>
+          <a:lstStyle/>
+          <a:p>
+            <a:r>
+              <a:rPr lang="fr-CH" dirty="0" smtClean="0"/>
               <a:t>Original </a:t>
             </a:r>
             <a:r>
@@ -16773,7 +16940,7 @@
           <a:p>
             <a:fld id="{5C659214-C5B2-4878-BE63-6680446A108B}" type="slidenum">
               <a:rPr lang="fr-CH" smtClean="0"/>
-              <a:t>21</a:t>
+              <a:t>22</a:t>
             </a:fld>
             <a:endParaRPr lang="fr-CH"/>
           </a:p>
@@ -16994,11 +17161,7 @@
           <a:p>
             <a:r>
               <a:rPr lang="fr-CH" dirty="0" smtClean="0"/>
-              <a:t>Project </a:t>
-            </a:r>
-            <a:r>
-              <a:rPr lang="fr-CH" dirty="0" smtClean="0"/>
-              <a:t>scope</a:t>
+              <a:t>Project scope</a:t>
             </a:r>
             <a:endParaRPr lang="fr-CH" dirty="0"/>
           </a:p>

</xml_diff>